<commit_message>
User Stories version 1.3
</commit_message>
<xml_diff>
--- a/prototypes/User Stories.pptx
+++ b/prototypes/User Stories.pptx
@@ -7,15 +7,14 @@
     <p:sldMasterId id="2147483662" r:id="rId4"/>
   </p:sldMasterIdLst>
   <p:handoutMasterIdLst>
-    <p:handoutMasterId r:id="rId11"/>
+    <p:handoutMasterId r:id="rId10"/>
   </p:handoutMasterIdLst>
   <p:sldIdLst>
     <p:sldId id="287" r:id="rId5"/>
     <p:sldId id="303" r:id="rId6"/>
-    <p:sldId id="268" r:id="rId7"/>
-    <p:sldId id="267" r:id="rId8"/>
-    <p:sldId id="305" r:id="rId9"/>
-    <p:sldId id="281" r:id="rId10"/>
+    <p:sldId id="267" r:id="rId7"/>
+    <p:sldId id="305" r:id="rId8"/>
+    <p:sldId id="281" r:id="rId9"/>
   </p:sldIdLst>
   <p:sldSz cx="9144000" cy="6858000" type="screen4x3"/>
   <p:notesSz cx="6858000" cy="9144000"/>
@@ -4764,7 +4763,6 @@
             <a:pPr algn="ctr"/>
             <a:r>
               <a:rPr lang="en-US">
-                <a:ln/>
                 <a:solidFill>
                   <a:schemeClr val="tx1"/>
                 </a:solidFill>
@@ -4780,7 +4778,6 @@
             </a:r>
             <a:r>
               <a:rPr lang="uk-UA">
-                <a:ln/>
                 <a:solidFill>
                   <a:schemeClr val="tx1"/>
                 </a:solidFill>
@@ -4796,7 +4793,6 @@
             </a:r>
             <a:r>
               <a:rPr lang="en-US">
-                <a:ln/>
                 <a:solidFill>
                   <a:schemeClr val="tx1"/>
                 </a:solidFill>
@@ -4811,7 +4807,6 @@
               <a:t>1</a:t>
             </a:r>
             <a:endParaRPr lang="en-US">
-              <a:ln/>
               <a:solidFill>
                 <a:schemeClr val="tx1"/>
               </a:solidFill>
@@ -4877,7 +4872,7 @@
       </p:grpSpPr>
       <p:sp>
         <p:nvSpPr>
-          <p:cNvPr id="3" name="Text Placeholder 2"/>
+          <p:cNvPr id="9" name="Текст 8"/>
           <p:cNvSpPr>
             <a:spLocks noGrp="1"/>
           </p:cNvSpPr>
@@ -4887,19 +4882,19 @@
         </p:nvSpPr>
         <p:spPr>
           <a:xfrm>
-            <a:off x="298179" y="1842049"/>
-            <a:ext cx="8675404" cy="5005161"/>
+            <a:off x="261620" y="943610"/>
+            <a:ext cx="8620760" cy="5157470"/>
           </a:xfrm>
         </p:spPr>
         <p:txBody>
           <a:bodyPr>
-            <a:normAutofit/>
+            <a:normAutofit fontScale="70000"/>
           </a:bodyPr>
           <a:lstStyle/>
           <a:p>
             <a:pPr marL="457200" indent="-457200" fontAlgn="auto">
               <a:lnSpc>
-                <a:spcPct val="140000"/>
+                <a:spcPct val="125000"/>
               </a:lnSpc>
               <a:spcBef>
                 <a:spcPts val="0"/>
@@ -4916,21 +4911,23 @@
             <a:r>
               <a:rPr lang="uk-UA" sz="1600" dirty="0">
                 <a:solidFill>
-                  <a:schemeClr val="tx1"/>
-                </a:solidFill>
+                  <a:srgbClr val="000000"/>
+                </a:solidFill>
+                <a:sym typeface="+mn-ea"/>
               </a:rPr>
               <a:t>Користувач заходить на стартову сторінку сайту</a:t>
             </a:r>
             <a:endParaRPr lang="uk-UA" sz="1600" dirty="0">
               <a:solidFill>
-                <a:schemeClr val="tx1"/>
+                <a:srgbClr val="000000"/>
               </a:solidFill>
+              <a:sym typeface="+mn-ea"/>
             </a:endParaRPr>
           </a:p>
           <a:p>
             <a:pPr lvl="1" fontAlgn="auto">
               <a:lnSpc>
-                <a:spcPct val="140000"/>
+                <a:spcPct val="125000"/>
               </a:lnSpc>
               <a:spcBef>
                 <a:spcPts val="0"/>
@@ -4947,7 +4944,7 @@
             <a:r>
               <a:rPr lang="uk-UA" sz="1600" i="1" dirty="0">
                 <a:solidFill>
-                  <a:schemeClr val="tx1"/>
+                  <a:srgbClr val="000000"/>
                 </a:solidFill>
                 <a:sym typeface="+mn-ea"/>
               </a:rPr>
@@ -4955,7 +4952,7 @@
             </a:r>
             <a:endParaRPr lang="uk-UA" sz="1600" i="1" dirty="0">
               <a:solidFill>
-                <a:schemeClr val="tx1"/>
+                <a:srgbClr val="000000"/>
               </a:solidFill>
               <a:sym typeface="+mn-ea"/>
             </a:endParaRPr>
@@ -4963,7 +4960,7 @@
           <a:p>
             <a:pPr marL="457200" indent="-457200" fontAlgn="auto">
               <a:lnSpc>
-                <a:spcPct val="140000"/>
+                <a:spcPct val="125000"/>
               </a:lnSpc>
               <a:spcBef>
                 <a:spcPts val="0"/>
@@ -4980,37 +4977,41 @@
             <a:r>
               <a:rPr lang="uk-UA" sz="1600" dirty="0">
                 <a:solidFill>
-                  <a:schemeClr val="tx1"/>
-                </a:solidFill>
+                  <a:srgbClr val="000000"/>
+                </a:solidFill>
+                <a:sym typeface="+mn-ea"/>
               </a:rPr>
               <a:t>Натискає кнопку “</a:t>
             </a:r>
             <a:r>
-              <a:rPr lang="en-US" sz="1600" dirty="0">
-                <a:solidFill>
-                  <a:schemeClr val="tx1"/>
-                </a:solidFill>
-              </a:rPr>
-              <a:t>All Universities</a:t>
-            </a:r>
-            <a:r>
               <a:rPr lang="uk-UA" sz="1600" dirty="0">
                 <a:solidFill>
-                  <a:schemeClr val="tx1"/>
-                </a:solidFill>
-              </a:rPr>
-              <a:t>”(“Усі Університети”)</a:t>
+                  <a:srgbClr val="000000"/>
+                </a:solidFill>
+                <a:sym typeface="+mn-ea"/>
+              </a:rPr>
+              <a:t>Тести на профоірєнтацію</a:t>
+            </a:r>
+            <a:r>
+              <a:rPr lang="uk-UA" sz="1600" dirty="0">
+                <a:solidFill>
+                  <a:srgbClr val="000000"/>
+                </a:solidFill>
+                <a:sym typeface="+mn-ea"/>
+              </a:rPr>
+              <a:t>”</a:t>
             </a:r>
             <a:endParaRPr lang="uk-UA" altLang="uk-UA" sz="1600" dirty="0">
               <a:solidFill>
-                <a:schemeClr val="tx1"/>
+                <a:srgbClr val="000000"/>
               </a:solidFill>
+              <a:sym typeface="+mn-ea"/>
             </a:endParaRPr>
           </a:p>
           <a:p>
             <a:pPr marL="457200" indent="-457200" fontAlgn="auto">
               <a:lnSpc>
-                <a:spcPct val="140000"/>
+                <a:spcPct val="125000"/>
               </a:lnSpc>
               <a:spcBef>
                 <a:spcPts val="0"/>
@@ -5027,21 +5028,23 @@
             <a:r>
               <a:rPr lang="uk-UA" altLang="en-US" sz="1600" dirty="0">
                 <a:solidFill>
-                  <a:schemeClr val="tx1"/>
-                </a:solidFill>
-              </a:rPr>
-              <a:t>Користувач попадає на сторінку з усіма університетами </a:t>
+                  <a:srgbClr val="000000"/>
+                </a:solidFill>
+                <a:sym typeface="+mn-ea"/>
+              </a:rPr>
+              <a:t>Користувач попадає на сторінку з де відображаються профорієнтаційні тести з інформацією про них, та можливістю пройти(кнопка “Розпочати Тест”)</a:t>
             </a:r>
             <a:endParaRPr lang="uk-UA" altLang="en-US" sz="1600" dirty="0">
               <a:solidFill>
-                <a:schemeClr val="tx1"/>
+                <a:srgbClr val="000000"/>
               </a:solidFill>
+              <a:sym typeface="+mn-ea"/>
             </a:endParaRPr>
           </a:p>
           <a:p>
             <a:pPr lvl="1" fontAlgn="auto">
               <a:lnSpc>
-                <a:spcPct val="140000"/>
+                <a:spcPct val="125000"/>
               </a:lnSpc>
               <a:spcBef>
                 <a:spcPts val="0"/>
@@ -5056,23 +5059,25 @@
               <a:buChar char=""/>
             </a:pPr>
             <a:r>
-              <a:rPr lang="uk-UA" altLang="uk-UA" sz="1600" i="1" dirty="0">
-                <a:solidFill>
-                  <a:schemeClr val="tx1"/>
-                </a:solidFill>
-              </a:rPr>
-              <a:t>створити сторінку з університетами</a:t>
-            </a:r>
-            <a:endParaRPr lang="uk-UA" altLang="uk-UA" sz="1600" i="1" dirty="0">
+              <a:rPr lang="uk-UA" altLang="en-US" sz="1600" i="1" dirty="0">
+                <a:solidFill>
+                  <a:srgbClr val="000000"/>
+                </a:solidFill>
+                <a:sym typeface="+mn-ea"/>
+              </a:rPr>
+              <a:t>Створити таблицю в БД, яка зберігатиме інформацію про тести.</a:t>
+            </a:r>
+            <a:endParaRPr lang="uk-UA" altLang="en-US" sz="1600" i="1" dirty="0">
               <a:solidFill>
-                <a:schemeClr val="tx1"/>
+                <a:srgbClr val="000000"/>
               </a:solidFill>
+              <a:sym typeface="+mn-ea"/>
             </a:endParaRPr>
           </a:p>
           <a:p>
             <a:pPr lvl="1" fontAlgn="auto">
               <a:lnSpc>
-                <a:spcPct val="140000"/>
+                <a:spcPct val="125000"/>
               </a:lnSpc>
               <a:spcBef>
                 <a:spcPts val="0"/>
@@ -5087,23 +5092,25 @@
               <a:buChar char=""/>
             </a:pPr>
             <a:r>
-              <a:rPr lang="uk-UA" altLang="uk-UA" sz="1600" i="1" dirty="0">
-                <a:solidFill>
-                  <a:schemeClr val="tx1"/>
-                </a:solidFill>
-              </a:rPr>
-              <a:t>створити таблицю з усіма університетами</a:t>
-            </a:r>
-            <a:endParaRPr lang="uk-UA" altLang="uk-UA" sz="1600" i="1" dirty="0">
+              <a:rPr lang="uk-UA" altLang="en-US" sz="1600" i="1" dirty="0">
+                <a:solidFill>
+                  <a:srgbClr val="000000"/>
+                </a:solidFill>
+                <a:sym typeface="+mn-ea"/>
+              </a:rPr>
+              <a:t>Імпортувати дані в таблиці.з інформацією про тести</a:t>
+            </a:r>
+            <a:endParaRPr lang="uk-UA" altLang="en-US" sz="1600" i="1" dirty="0">
               <a:solidFill>
-                <a:schemeClr val="tx1"/>
+                <a:srgbClr val="000000"/>
               </a:solidFill>
+              <a:sym typeface="+mn-ea"/>
             </a:endParaRPr>
           </a:p>
           <a:p>
             <a:pPr lvl="1" fontAlgn="auto">
               <a:lnSpc>
-                <a:spcPct val="140000"/>
+                <a:spcPct val="125000"/>
               </a:lnSpc>
               <a:spcBef>
                 <a:spcPts val="0"/>
@@ -5118,31 +5125,43 @@
               <a:buChar char=""/>
             </a:pPr>
             <a:r>
-              <a:rPr lang="uk-UA" altLang="uk-UA" sz="1600" i="1" dirty="0">
-                <a:solidFill>
-                  <a:schemeClr val="tx1"/>
-                </a:solidFill>
-              </a:rPr>
-              <a:t>імпортувати дані в таблицю університети з сайту </a:t>
-            </a:r>
-            <a:r>
-              <a:rPr lang="en-US" altLang="uk-UA" sz="1600" i="1" dirty="0">
-                <a:solidFill>
-                  <a:schemeClr val="tx1"/>
-                </a:solidFill>
-              </a:rPr>
-              <a:t>Vstup.info</a:t>
-            </a:r>
-            <a:endParaRPr lang="en-US" altLang="uk-UA" sz="1600" i="1" dirty="0">
+              <a:rPr lang="uk-UA" altLang="en-US" sz="1600" i="1" dirty="0">
+                <a:solidFill>
+                  <a:srgbClr val="000000"/>
+                </a:solidFill>
+                <a:sym typeface="+mn-ea"/>
+              </a:rPr>
+              <a:t>Розробити </a:t>
+            </a:r>
+            <a:r>
+              <a:rPr lang="en-US" altLang="en-US" sz="1600" i="1" dirty="0">
+                <a:solidFill>
+                  <a:srgbClr val="000000"/>
+                </a:solidFill>
+                <a:sym typeface="+mn-ea"/>
+              </a:rPr>
+              <a:t>API </a:t>
+            </a:r>
+            <a:r>
+              <a:rPr lang="uk-UA" altLang="en-US" sz="1600" i="1" dirty="0">
+                <a:solidFill>
+                  <a:srgbClr val="000000"/>
+                </a:solidFill>
+                <a:sym typeface="+mn-ea"/>
+              </a:rPr>
+              <a:t>для отримування інформації про тести</a:t>
+            </a:r>
+            <a:endParaRPr lang="uk-UA" altLang="en-US" sz="1600" i="1" dirty="0">
               <a:solidFill>
-                <a:schemeClr val="tx1"/>
+                <a:srgbClr val="000000"/>
               </a:solidFill>
+              <a:sym typeface="+mn-ea"/>
             </a:endParaRPr>
           </a:p>
           <a:p>
             <a:pPr lvl="1" fontAlgn="auto">
               <a:lnSpc>
-                <a:spcPct val="140000"/>
+                <a:spcPct val="125000"/>
               </a:lnSpc>
               <a:spcBef>
                 <a:spcPts val="0"/>
@@ -5159,45 +5178,23 @@
             <a:r>
               <a:rPr lang="uk-UA" altLang="en-US" sz="1600" i="1" dirty="0">
                 <a:solidFill>
-                  <a:schemeClr val="tx1"/>
-                </a:solidFill>
-              </a:rPr>
-              <a:t>розробити </a:t>
-            </a:r>
-            <a:r>
-              <a:rPr lang="en-US" altLang="en-US" sz="1600" i="1" dirty="0">
-                <a:solidFill>
-                  <a:schemeClr val="tx1"/>
-                </a:solidFill>
-              </a:rPr>
-              <a:t>API </a:t>
-            </a:r>
-            <a:r>
-              <a:rPr lang="uk-UA" altLang="en-US" sz="1600" i="1" dirty="0">
-                <a:solidFill>
-                  <a:schemeClr val="tx1"/>
-                </a:solidFill>
-              </a:rPr>
-              <a:t>для виводу усіх університетів</a:t>
-            </a:r>
-            <a:r>
-              <a:rPr lang="uk-UA" altLang="uk-UA" sz="1600" i="1" dirty="0">
-                <a:solidFill>
-                  <a:schemeClr val="tx1"/>
-                </a:solidFill>
-              </a:rPr>
-              <a:t> </a:t>
-            </a:r>
-            <a:endParaRPr lang="uk-UA" altLang="uk-UA" sz="1600" i="1" dirty="0">
+                  <a:srgbClr val="000000"/>
+                </a:solidFill>
+                <a:sym typeface="+mn-ea"/>
+              </a:rPr>
+              <a:t>Створити сторінку де розміщується інформація про тест</a:t>
+            </a:r>
+            <a:endParaRPr lang="uk-UA" altLang="en-US" sz="1600" i="1" dirty="0">
               <a:solidFill>
-                <a:schemeClr val="tx1"/>
+                <a:srgbClr val="000000"/>
               </a:solidFill>
+              <a:sym typeface="+mn-ea"/>
             </a:endParaRPr>
           </a:p>
           <a:p>
-            <a:pPr marL="457200" indent="-457200" fontAlgn="auto">
+            <a:pPr marL="457200" lvl="0" indent="-457200" fontAlgn="auto">
               <a:lnSpc>
-                <a:spcPct val="140000"/>
+                <a:spcPct val="125000"/>
               </a:lnSpc>
               <a:spcBef>
                 <a:spcPts val="0"/>
@@ -5208,27 +5205,62 @@
               <a:buClr>
                 <a:srgbClr val="000000"/>
               </a:buClr>
-              <a:buFont typeface="Arial" panose="020B0604020202020204" pitchFamily="34" charset="0"/>
+              <a:buFont typeface="Wingdings" panose="05000000000000000000" charset="0"/>
               <a:buAutoNum type="arabicPeriod"/>
             </a:pPr>
             <a:r>
               <a:rPr lang="uk-UA" altLang="en-US" sz="1600" dirty="0">
                 <a:solidFill>
-                  <a:schemeClr val="tx1"/>
-                </a:solidFill>
-              </a:rPr>
-              <a:t>Користувач обирає область</a:t>
+                  <a:srgbClr val="000000"/>
+                </a:solidFill>
+                <a:sym typeface="+mn-ea"/>
+              </a:rPr>
+              <a:t>Користувач обирає тест і натискає кнопку “Розпочати тест”</a:t>
             </a:r>
             <a:endParaRPr lang="uk-UA" altLang="en-US" sz="1600" dirty="0">
               <a:solidFill>
-                <a:schemeClr val="tx1"/>
+                <a:srgbClr val="000000"/>
               </a:solidFill>
+              <a:sym typeface="+mn-ea"/>
             </a:endParaRPr>
           </a:p>
           <a:p>
-            <a:pPr lvl="1" fontAlgn="auto">
+            <a:pPr marL="457200" lvl="0" indent="-457200" fontAlgn="auto">
               <a:lnSpc>
-                <a:spcPct val="140000"/>
+                <a:spcPct val="125000"/>
+              </a:lnSpc>
+              <a:spcBef>
+                <a:spcPts val="0"/>
+              </a:spcBef>
+              <a:spcAft>
+                <a:spcPts val="0"/>
+              </a:spcAft>
+              <a:buClr>
+                <a:srgbClr val="000000"/>
+              </a:buClr>
+              <a:buFont typeface="Wingdings" panose="05000000000000000000" charset="0"/>
+              <a:buAutoNum type="arabicPeriod"/>
+            </a:pPr>
+            <a:r>
+              <a:rPr lang="uk-UA" altLang="en-US" sz="1600" dirty="0">
+                <a:solidFill>
+                  <a:srgbClr val="000000"/>
+                </a:solidFill>
+                <a:sym typeface="+mn-ea"/>
+              </a:rPr>
+              <a:t>Користувач попадає на сторінку для проходження тесту</a:t>
+            </a:r>
+            <a:endParaRPr lang="uk-UA" altLang="en-US" sz="1600" dirty="0">
+              <a:solidFill>
+                <a:srgbClr val="000000"/>
+              </a:solidFill>
+              <a:sym typeface="+mn-ea"/>
+            </a:endParaRPr>
+          </a:p>
+          <a:p>
+            <a:pPr marL="742950" lvl="1" indent="-285750" fontAlgn="auto">
+              <a:lnSpc>
+                <a:spcPct val="125000"/>
               </a:lnSpc>
               <a:spcBef>
                 <a:spcPts val="0"/>
@@ -5245,21 +5277,23 @@
             <a:r>
               <a:rPr lang="uk-UA" altLang="en-US" sz="1600" i="1" dirty="0">
                 <a:solidFill>
-                  <a:schemeClr val="tx1"/>
-                </a:solidFill>
-              </a:rPr>
-              <a:t>створити таблицю з областями України</a:t>
+                  <a:srgbClr val="000000"/>
+                </a:solidFill>
+                <a:sym typeface="+mn-ea"/>
+              </a:rPr>
+              <a:t>Розробити таблицю з питаннями до тесту</a:t>
             </a:r>
             <a:endParaRPr lang="uk-UA" altLang="en-US" sz="1600" i="1" dirty="0">
               <a:solidFill>
-                <a:schemeClr val="tx1"/>
+                <a:srgbClr val="000000"/>
               </a:solidFill>
+              <a:sym typeface="+mn-ea"/>
             </a:endParaRPr>
           </a:p>
           <a:p>
-            <a:pPr lvl="1" fontAlgn="auto">
+            <a:pPr marL="742950" lvl="1" indent="-285750" fontAlgn="auto">
               <a:lnSpc>
-                <a:spcPct val="140000"/>
+                <a:spcPct val="125000"/>
               </a:lnSpc>
               <a:spcBef>
                 <a:spcPts val="0"/>
@@ -5276,37 +5310,107 @@
             <a:r>
               <a:rPr lang="uk-UA" altLang="en-US" sz="1600" i="1" dirty="0">
                 <a:solidFill>
-                  <a:schemeClr val="tx1"/>
-                </a:solidFill>
-              </a:rPr>
-              <a:t>розробити </a:t>
-            </a:r>
-            <a:r>
-              <a:rPr lang="en-US" altLang="en-US" sz="1600" i="1" dirty="0">
-                <a:solidFill>
-                  <a:schemeClr val="tx1"/>
-                </a:solidFill>
-              </a:rPr>
-              <a:t>API </a:t>
-            </a:r>
-            <a:r>
-              <a:rPr lang="uk-UA" altLang="en-US" sz="1600" i="1" dirty="0">
-                <a:solidFill>
-                  <a:schemeClr val="tx1"/>
-                </a:solidFill>
-              </a:rPr>
-              <a:t>для виводу університетів </a:t>
+                  <a:srgbClr val="000000"/>
+                </a:solidFill>
+                <a:sym typeface="+mn-ea"/>
+              </a:rPr>
+              <a:t>Імпортувати питання в таблицю </a:t>
             </a:r>
             <a:endParaRPr lang="uk-UA" altLang="en-US" sz="1600" i="1" dirty="0">
               <a:solidFill>
-                <a:schemeClr val="tx1"/>
+                <a:srgbClr val="000000"/>
               </a:solidFill>
+              <a:sym typeface="+mn-ea"/>
+            </a:endParaRPr>
+          </a:p>
+          <a:p>
+            <a:pPr marL="742950" lvl="1" indent="-285750" fontAlgn="auto">
+              <a:lnSpc>
+                <a:spcPct val="125000"/>
+              </a:lnSpc>
+              <a:spcBef>
+                <a:spcPts val="0"/>
+              </a:spcBef>
+              <a:spcAft>
+                <a:spcPts val="0"/>
+              </a:spcAft>
+              <a:buClr>
+                <a:srgbClr val="000000"/>
+              </a:buClr>
+              <a:buFont typeface="Wingdings" panose="05000000000000000000" charset="0"/>
+              <a:buChar char=""/>
+            </a:pPr>
+            <a:r>
+              <a:rPr lang="uk-UA" altLang="en-US" sz="1600" i="1" dirty="0">
+                <a:solidFill>
+                  <a:srgbClr val="000000"/>
+                </a:solidFill>
+                <a:sym typeface="+mn-ea"/>
+              </a:rPr>
+              <a:t>Розробити </a:t>
+            </a:r>
+            <a:r>
+              <a:rPr lang="en-US" altLang="en-US" sz="1600" i="1" dirty="0">
+                <a:solidFill>
+                  <a:srgbClr val="000000"/>
+                </a:solidFill>
+                <a:sym typeface="+mn-ea"/>
+              </a:rPr>
+              <a:t>API </a:t>
+            </a:r>
+            <a:r>
+              <a:rPr lang="uk-UA" altLang="en-US" sz="1600" i="1" dirty="0">
+                <a:solidFill>
+                  <a:srgbClr val="000000"/>
+                </a:solidFill>
+                <a:sym typeface="+mn-ea"/>
+              </a:rPr>
+              <a:t>завантаження питань на сторінку тесту</a:t>
+            </a:r>
+            <a:endParaRPr lang="uk-UA" altLang="en-US" sz="1600" i="1" dirty="0">
+              <a:solidFill>
+                <a:srgbClr val="000000"/>
+              </a:solidFill>
+              <a:sym typeface="+mn-ea"/>
+            </a:endParaRPr>
+          </a:p>
+          <a:p>
+            <a:pPr marL="742950" lvl="1" indent="-285750" fontAlgn="auto">
+              <a:lnSpc>
+                <a:spcPct val="125000"/>
+              </a:lnSpc>
+              <a:spcBef>
+                <a:spcPts val="0"/>
+              </a:spcBef>
+              <a:spcAft>
+                <a:spcPts val="0"/>
+              </a:spcAft>
+              <a:buClr>
+                <a:srgbClr val="000000"/>
+              </a:buClr>
+              <a:buFont typeface="Wingdings" panose="05000000000000000000" charset="0"/>
+              <a:buChar char=""/>
+            </a:pPr>
+            <a:r>
+              <a:rPr lang="uk-UA" altLang="en-US" sz="1600" i="1" dirty="0">
+                <a:solidFill>
+                  <a:srgbClr val="000000"/>
+                </a:solidFill>
+                <a:sym typeface="+mn-ea"/>
+              </a:rPr>
+              <a:t>Створити сторінку для проведення тестування </a:t>
+            </a:r>
+            <a:endParaRPr lang="uk-UA" altLang="en-US" sz="1600" i="1" dirty="0">
+              <a:solidFill>
+                <a:srgbClr val="000000"/>
+              </a:solidFill>
+              <a:sym typeface="+mn-ea"/>
             </a:endParaRPr>
           </a:p>
           <a:p>
             <a:pPr marL="457200" lvl="0" indent="-457200" fontAlgn="auto">
               <a:lnSpc>
-                <a:spcPct val="140000"/>
+                <a:spcPct val="125000"/>
               </a:lnSpc>
               <a:spcBef>
                 <a:spcPts val="0"/>
@@ -5323,33 +5427,338 @@
             <a:r>
               <a:rPr lang="uk-UA" altLang="en-US" sz="1600" dirty="0">
                 <a:solidFill>
-                  <a:schemeClr val="tx1"/>
-                </a:solidFill>
-              </a:rPr>
-              <a:t>Користувачу відображуюється інформація з університетами в обраній області</a:t>
+                  <a:srgbClr val="000000"/>
+                </a:solidFill>
+                <a:sym typeface="+mn-ea"/>
+              </a:rPr>
+              <a:t>Користувач відповідає на всі питання та натискає кнопку “Підтвердити”.</a:t>
             </a:r>
             <a:endParaRPr lang="uk-UA" altLang="en-US" sz="1600" dirty="0">
               <a:solidFill>
-                <a:schemeClr val="tx1"/>
+                <a:srgbClr val="000000"/>
               </a:solidFill>
+              <a:sym typeface="+mn-ea"/>
+            </a:endParaRPr>
+          </a:p>
+          <a:p>
+            <a:pPr lvl="1" fontAlgn="auto">
+              <a:lnSpc>
+                <a:spcPct val="125000"/>
+              </a:lnSpc>
+              <a:spcBef>
+                <a:spcPts val="0"/>
+              </a:spcBef>
+              <a:spcAft>
+                <a:spcPts val="0"/>
+              </a:spcAft>
+              <a:buClr>
+                <a:srgbClr val="000000"/>
+              </a:buClr>
+              <a:buFont typeface="Wingdings" panose="05000000000000000000" charset="0"/>
+              <a:buChar char=""/>
+            </a:pPr>
+            <a:r>
+              <a:rPr lang="uk-UA" altLang="en-US" sz="1600" i="1" dirty="0">
+                <a:solidFill>
+                  <a:srgbClr val="000000"/>
+                </a:solidFill>
+                <a:sym typeface="+mn-ea"/>
+              </a:rPr>
+              <a:t>Розробити </a:t>
+            </a:r>
+            <a:r>
+              <a:rPr lang="en-US" altLang="en-US" sz="1600" i="1" dirty="0">
+                <a:solidFill>
+                  <a:srgbClr val="000000"/>
+                </a:solidFill>
+                <a:sym typeface="+mn-ea"/>
+              </a:rPr>
+              <a:t>API </a:t>
+            </a:r>
+            <a:r>
+              <a:rPr lang="uk-UA" altLang="en-US" sz="1600" i="1" dirty="0">
+                <a:solidFill>
+                  <a:srgbClr val="000000"/>
+                </a:solidFill>
+                <a:sym typeface="+mn-ea"/>
+              </a:rPr>
+              <a:t>для обрахунку результатів тестування</a:t>
+            </a:r>
+            <a:endParaRPr lang="uk-UA" altLang="en-US" sz="1600" i="1" dirty="0">
+              <a:solidFill>
+                <a:srgbClr val="000000"/>
+              </a:solidFill>
+              <a:sym typeface="+mn-ea"/>
+            </a:endParaRPr>
+          </a:p>
+          <a:p>
+            <a:pPr marL="457200" lvl="0" indent="-457200" fontAlgn="auto">
+              <a:lnSpc>
+                <a:spcPct val="125000"/>
+              </a:lnSpc>
+              <a:spcBef>
+                <a:spcPts val="0"/>
+              </a:spcBef>
+              <a:spcAft>
+                <a:spcPts val="0"/>
+              </a:spcAft>
+              <a:buClr>
+                <a:srgbClr val="000000"/>
+              </a:buClr>
+              <a:buFont typeface="Wingdings" panose="05000000000000000000" charset="0"/>
+              <a:buAutoNum type="arabicPeriod"/>
+            </a:pPr>
+            <a:r>
+              <a:rPr lang="uk-UA" altLang="en-US" sz="1600" dirty="0">
+                <a:solidFill>
+                  <a:srgbClr val="000000"/>
+                </a:solidFill>
+                <a:sym typeface="+mn-ea"/>
+              </a:rPr>
+              <a:t>Користувач попадає на сторінку з результатом тестування та рекомендаціями з спеціальностями та університетами.</a:t>
+            </a:r>
+            <a:endParaRPr lang="uk-UA" altLang="en-US" sz="1600" dirty="0">
+              <a:solidFill>
+                <a:srgbClr val="000000"/>
+              </a:solidFill>
+              <a:sym typeface="+mn-ea"/>
+            </a:endParaRPr>
+          </a:p>
+          <a:p>
+            <a:pPr lvl="1" fontAlgn="auto">
+              <a:lnSpc>
+                <a:spcPct val="125000"/>
+              </a:lnSpc>
+              <a:spcBef>
+                <a:spcPts val="0"/>
+              </a:spcBef>
+              <a:spcAft>
+                <a:spcPts val="0"/>
+              </a:spcAft>
+              <a:buClr>
+                <a:srgbClr val="000000"/>
+              </a:buClr>
+              <a:buFont typeface="Wingdings" panose="05000000000000000000" charset="0"/>
+              <a:buChar char=""/>
+            </a:pPr>
+            <a:r>
+              <a:rPr lang="uk-UA" altLang="en-US" sz="1600" i="1" dirty="0">
+                <a:solidFill>
+                  <a:srgbClr val="000000"/>
+                </a:solidFill>
+                <a:sym typeface="+mn-ea"/>
+              </a:rPr>
+              <a:t>Створити таблиці в БД які зберігатимуть інформацію про університети, спеціальності  та конкурсами для кожної спеціальності в оеремомому університеті</a:t>
+            </a:r>
+            <a:endParaRPr lang="uk-UA" altLang="en-US" sz="1600" i="1" dirty="0">
+              <a:solidFill>
+                <a:srgbClr val="000000"/>
+              </a:solidFill>
+              <a:sym typeface="+mn-ea"/>
+            </a:endParaRPr>
+          </a:p>
+          <a:p>
+            <a:pPr lvl="1" fontAlgn="auto">
+              <a:lnSpc>
+                <a:spcPct val="125000"/>
+              </a:lnSpc>
+              <a:spcBef>
+                <a:spcPts val="0"/>
+              </a:spcBef>
+              <a:spcAft>
+                <a:spcPts val="0"/>
+              </a:spcAft>
+              <a:buClr>
+                <a:srgbClr val="000000"/>
+              </a:buClr>
+              <a:buFont typeface="Wingdings" panose="05000000000000000000" charset="0"/>
+              <a:buChar char=""/>
+            </a:pPr>
+            <a:r>
+              <a:rPr lang="uk-UA" altLang="en-US" sz="1600" i="1" dirty="0">
+                <a:solidFill>
+                  <a:srgbClr val="000000"/>
+                </a:solidFill>
+                <a:sym typeface="+mn-ea"/>
+              </a:rPr>
+              <a:t>Імпортувати дані в таблиці про університети з сайту </a:t>
+            </a:r>
+            <a:r>
+              <a:rPr lang="en-US" altLang="en-US" sz="1600" i="1" dirty="0">
+                <a:solidFill>
+                  <a:srgbClr val="000000"/>
+                </a:solidFill>
+                <a:sym typeface="+mn-ea"/>
+              </a:rPr>
+              <a:t>Vstup.info.</a:t>
+            </a:r>
+            <a:endParaRPr lang="en-US" altLang="en-US" sz="1600" i="1" dirty="0">
+              <a:solidFill>
+                <a:srgbClr val="000000"/>
+              </a:solidFill>
+              <a:sym typeface="+mn-ea"/>
+            </a:endParaRPr>
+          </a:p>
+          <a:p>
+            <a:pPr lvl="1" fontAlgn="auto">
+              <a:lnSpc>
+                <a:spcPct val="125000"/>
+              </a:lnSpc>
+              <a:spcBef>
+                <a:spcPts val="0"/>
+              </a:spcBef>
+              <a:spcAft>
+                <a:spcPts val="0"/>
+              </a:spcAft>
+              <a:buClr>
+                <a:srgbClr val="000000"/>
+              </a:buClr>
+              <a:buFont typeface="Wingdings" panose="05000000000000000000" charset="0"/>
+              <a:buChar char=""/>
+            </a:pPr>
+            <a:r>
+              <a:rPr lang="uk-UA" altLang="en-US" sz="1600" i="1" dirty="0">
+                <a:solidFill>
+                  <a:srgbClr val="000000"/>
+                </a:solidFill>
+                <a:sym typeface="+mn-ea"/>
+              </a:rPr>
+              <a:t>Розробити </a:t>
+            </a:r>
+            <a:r>
+              <a:rPr lang="en-US" altLang="en-US" sz="1600" i="1" dirty="0">
+                <a:solidFill>
+                  <a:srgbClr val="000000"/>
+                </a:solidFill>
+                <a:sym typeface="+mn-ea"/>
+              </a:rPr>
+              <a:t>API </a:t>
+            </a:r>
+            <a:r>
+              <a:rPr lang="uk-UA" altLang="en-US" sz="1600" i="1" dirty="0">
+                <a:solidFill>
+                  <a:srgbClr val="000000"/>
+                </a:solidFill>
+                <a:sym typeface="+mn-ea"/>
+              </a:rPr>
+              <a:t>для </a:t>
+            </a:r>
+            <a:r>
+              <a:rPr lang="uk-UA" altLang="en-US" sz="1600" i="1" dirty="0">
+                <a:solidFill>
+                  <a:srgbClr val="000000"/>
+                </a:solidFill>
+                <a:sym typeface="+mn-ea"/>
+              </a:rPr>
+              <a:t>виведення результату тестування, та рекомендованими галузями на основі результатів</a:t>
+            </a:r>
+            <a:endParaRPr lang="uk-UA" altLang="en-US" sz="1600" i="1" dirty="0">
+              <a:solidFill>
+                <a:srgbClr val="000000"/>
+              </a:solidFill>
+              <a:sym typeface="+mn-ea"/>
+            </a:endParaRPr>
+          </a:p>
+          <a:p>
+            <a:pPr lvl="1" fontAlgn="auto">
+              <a:lnSpc>
+                <a:spcPct val="125000"/>
+              </a:lnSpc>
+              <a:spcBef>
+                <a:spcPts val="0"/>
+              </a:spcBef>
+              <a:spcAft>
+                <a:spcPts val="0"/>
+              </a:spcAft>
+              <a:buClr>
+                <a:srgbClr val="000000"/>
+              </a:buClr>
+              <a:buFont typeface="Wingdings" panose="05000000000000000000" charset="0"/>
+              <a:buChar char=""/>
+            </a:pPr>
+            <a:r>
+              <a:rPr lang="uk-UA" altLang="en-US" sz="1600" i="1" dirty="0">
+                <a:solidFill>
+                  <a:srgbClr val="000000"/>
+                </a:solidFill>
+                <a:sym typeface="+mn-ea"/>
+              </a:rPr>
+              <a:t>Розробити </a:t>
+            </a:r>
+            <a:r>
+              <a:rPr lang="en-US" altLang="en-US" sz="1600" i="1" dirty="0">
+                <a:solidFill>
+                  <a:srgbClr val="000000"/>
+                </a:solidFill>
+                <a:sym typeface="+mn-ea"/>
+              </a:rPr>
+              <a:t>API </a:t>
+            </a:r>
+            <a:r>
+              <a:rPr lang="uk-UA" altLang="en-US" sz="1600" i="1" dirty="0">
+                <a:solidFill>
+                  <a:srgbClr val="000000"/>
+                </a:solidFill>
+                <a:sym typeface="+mn-ea"/>
+              </a:rPr>
+              <a:t>для виведення “Топ 5” університетів з спеціальностями за результатами тестування</a:t>
+            </a:r>
+            <a:endParaRPr lang="uk-UA" altLang="en-US" sz="1600" i="1" dirty="0">
+              <a:solidFill>
+                <a:srgbClr val="000000"/>
+              </a:solidFill>
+              <a:sym typeface="+mn-ea"/>
+            </a:endParaRPr>
+          </a:p>
+          <a:p>
+            <a:pPr lvl="1" fontAlgn="auto">
+              <a:lnSpc>
+                <a:spcPct val="125000"/>
+              </a:lnSpc>
+              <a:spcBef>
+                <a:spcPts val="0"/>
+              </a:spcBef>
+              <a:spcAft>
+                <a:spcPts val="0"/>
+              </a:spcAft>
+              <a:buClr>
+                <a:srgbClr val="000000"/>
+              </a:buClr>
+              <a:buFont typeface="Wingdings" panose="05000000000000000000" charset="0"/>
+              <a:buChar char=""/>
+            </a:pPr>
+            <a:r>
+              <a:rPr lang="uk-UA" altLang="en-US" sz="1600" i="1" dirty="0">
+                <a:solidFill>
+                  <a:srgbClr val="000000"/>
+                </a:solidFill>
+                <a:sym typeface="+mn-ea"/>
+              </a:rPr>
+              <a:t>Розробити Сторінку для Результатів Тестування</a:t>
+            </a:r>
+            <a:endParaRPr lang="uk-UA" altLang="en-US" sz="1600" i="1" dirty="0">
+              <a:solidFill>
+                <a:srgbClr val="000000"/>
+              </a:solidFill>
+              <a:sym typeface="+mn-ea"/>
             </a:endParaRPr>
           </a:p>
         </p:txBody>
       </p:sp>
       <p:sp>
         <p:nvSpPr>
-          <p:cNvPr id="2" name="Subtitle 1"/>
+          <p:cNvPr id="8" name="Заголовок 7"/>
           <p:cNvSpPr>
             <a:spLocks noGrp="1"/>
           </p:cNvSpPr>
           <p:nvPr>
-            <p:ph type="subTitle" idx="1"/>
+            <p:ph type="title"/>
           </p:nvPr>
         </p:nvSpPr>
         <p:spPr>
           <a:xfrm>
-            <a:off x="298450" y="808355"/>
-            <a:ext cx="8648700" cy="645795"/>
+            <a:off x="272415" y="127000"/>
+            <a:ext cx="8674100" cy="816610"/>
           </a:xfrm>
         </p:spPr>
         <p:txBody>
@@ -5357,23 +5766,27 @@
           <a:lstStyle/>
           <a:p>
             <a:r>
-              <a:rPr lang="en-US" sz="2400" dirty="0"/>
-              <a:t>#1 </a:t>
+              <a:rPr lang="en-US" sz="1800"/>
+              <a:t>#</a:t>
+            </a:r>
+            <a:r>
+              <a:rPr lang="uk-UA" altLang="en-US" sz="1800"/>
+              <a:t>1 </a:t>
             </a:r>
             <a:br>
-              <a:rPr lang="en-US" sz="2400" dirty="0"/>
+              <a:rPr lang="uk-UA" altLang="en-US" sz="1800"/>
             </a:br>
             <a:r>
-              <a:rPr lang="uk-UA" altLang="en-US" sz="2400" dirty="0"/>
-              <a:t>Як користувач я б хотів зайти на сторінку з університетами переглянути список університетів Львівської області.</a:t>
-            </a:r>
-            <a:endParaRPr lang="uk-UA" altLang="en-US" sz="2400" dirty="0"/>
+              <a:rPr lang="uk-UA" sz="1800"/>
+              <a:t>Як користувач, я б хотів хотів зайти на сторінку з тестами на профорієнтацію, пройти один з них, і отримати результат з рекомендаціями на спеціальності</a:t>
+            </a:r>
+            <a:endParaRPr lang="uk-UA" sz="1800"/>
           </a:p>
         </p:txBody>
       </p:sp>
       <p:pic>
         <p:nvPicPr>
-          <p:cNvPr id="4" name="Picture 3" descr="User ico (2)"/>
+          <p:cNvPr id="3" name="Picture 2" descr="User ico (1)"/>
           <p:cNvPicPr>
             <a:picLocks noChangeAspect="1"/>
           </p:cNvPicPr>
@@ -5387,8 +5800,8 @@
         </p:blipFill>
         <p:spPr>
           <a:xfrm>
-            <a:off x="7397750" y="1893570"/>
-            <a:ext cx="972185" cy="972185"/>
+            <a:off x="8369300" y="793750"/>
+            <a:ext cx="748665" cy="748665"/>
           </a:xfrm>
           <a:prstGeom prst="rect">
             <a:avLst/>
@@ -5419,534 +5832,6 @@
         <p:cNvGrpSpPr/>
         <p:nvPr/>
       </p:nvGrpSpPr>
-      <p:grpSpPr>
-        <a:xfrm>
-          <a:off x="0" y="0"/>
-          <a:ext cx="0" cy="0"/>
-          <a:chOff x="0" y="0"/>
-          <a:chExt cx="0" cy="0"/>
-        </a:xfrm>
-      </p:grpSpPr>
-      <p:sp>
-        <p:nvSpPr>
-          <p:cNvPr id="9" name="Текст 8"/>
-          <p:cNvSpPr>
-            <a:spLocks noGrp="1"/>
-          </p:cNvSpPr>
-          <p:nvPr>
-            <p:ph type="body" sz="quarter" idx="10"/>
-          </p:nvPr>
-        </p:nvSpPr>
-        <p:spPr/>
-        <p:txBody>
-          <a:bodyPr>
-            <a:normAutofit/>
-          </a:bodyPr>
-          <a:lstStyle/>
-          <a:p>
-            <a:pPr marL="457200" indent="-457200" fontAlgn="auto">
-              <a:lnSpc>
-                <a:spcPct val="140000"/>
-              </a:lnSpc>
-              <a:spcBef>
-                <a:spcPts val="0"/>
-              </a:spcBef>
-              <a:spcAft>
-                <a:spcPts val="0"/>
-              </a:spcAft>
-              <a:buClr>
-                <a:srgbClr val="000000"/>
-              </a:buClr>
-              <a:buFont typeface="Arial" panose="020B0604020202020204" pitchFamily="34" charset="0"/>
-              <a:buAutoNum type="arabicPeriod"/>
-            </a:pPr>
-            <a:r>
-              <a:rPr lang="uk-UA" sz="1600" dirty="0">
-                <a:solidFill>
-                  <a:srgbClr val="000000"/>
-                </a:solidFill>
-                <a:sym typeface="+mn-ea"/>
-              </a:rPr>
-              <a:t>Користувач заходить на стартову сторінку сайту</a:t>
-            </a:r>
-            <a:endParaRPr lang="uk-UA" sz="1600" i="1" dirty="0">
-              <a:solidFill>
-                <a:srgbClr val="000000"/>
-              </a:solidFill>
-              <a:sym typeface="+mn-ea"/>
-            </a:endParaRPr>
-          </a:p>
-          <a:p>
-            <a:pPr marL="457200" indent="-457200" fontAlgn="auto">
-              <a:lnSpc>
-                <a:spcPct val="140000"/>
-              </a:lnSpc>
-              <a:spcBef>
-                <a:spcPts val="0"/>
-              </a:spcBef>
-              <a:spcAft>
-                <a:spcPts val="0"/>
-              </a:spcAft>
-              <a:buClr>
-                <a:srgbClr val="000000"/>
-              </a:buClr>
-              <a:buFont typeface="Arial" panose="020B0604020202020204" pitchFamily="34" charset="0"/>
-              <a:buAutoNum type="arabicPeriod"/>
-            </a:pPr>
-            <a:r>
-              <a:rPr lang="uk-UA" sz="1600" dirty="0">
-                <a:solidFill>
-                  <a:srgbClr val="000000"/>
-                </a:solidFill>
-                <a:sym typeface="+mn-ea"/>
-              </a:rPr>
-              <a:t>Натискає кнопку “</a:t>
-            </a:r>
-            <a:r>
-              <a:rPr lang="en-US" sz="1600" dirty="0">
-                <a:solidFill>
-                  <a:srgbClr val="000000"/>
-                </a:solidFill>
-                <a:sym typeface="+mn-ea"/>
-              </a:rPr>
-              <a:t>Proforientation test</a:t>
-            </a:r>
-            <a:r>
-              <a:rPr lang="uk-UA" sz="1600" dirty="0">
-                <a:solidFill>
-                  <a:srgbClr val="000000"/>
-                </a:solidFill>
-                <a:sym typeface="+mn-ea"/>
-              </a:rPr>
-              <a:t>”(Тести на профоірєнтацію)</a:t>
-            </a:r>
-            <a:endParaRPr lang="uk-UA" altLang="uk-UA" sz="1600" dirty="0">
-              <a:solidFill>
-                <a:srgbClr val="000000"/>
-              </a:solidFill>
-              <a:sym typeface="+mn-ea"/>
-            </a:endParaRPr>
-          </a:p>
-          <a:p>
-            <a:pPr marL="457200" indent="-457200" fontAlgn="auto">
-              <a:lnSpc>
-                <a:spcPct val="140000"/>
-              </a:lnSpc>
-              <a:spcBef>
-                <a:spcPts val="0"/>
-              </a:spcBef>
-              <a:spcAft>
-                <a:spcPts val="0"/>
-              </a:spcAft>
-              <a:buClr>
-                <a:srgbClr val="000000"/>
-              </a:buClr>
-              <a:buFont typeface="Arial" panose="020B0604020202020204" pitchFamily="34" charset="0"/>
-              <a:buAutoNum type="arabicPeriod"/>
-            </a:pPr>
-            <a:r>
-              <a:rPr lang="uk-UA" altLang="en-US" sz="1600" dirty="0">
-                <a:solidFill>
-                  <a:srgbClr val="000000"/>
-                </a:solidFill>
-                <a:sym typeface="+mn-ea"/>
-              </a:rPr>
-              <a:t>Користувач попадає на сторінку з профорієнтаційним тестом</a:t>
-            </a:r>
-            <a:endParaRPr lang="uk-UA" altLang="en-US" sz="1600" dirty="0">
-              <a:solidFill>
-                <a:srgbClr val="000000"/>
-              </a:solidFill>
-              <a:sym typeface="+mn-ea"/>
-            </a:endParaRPr>
-          </a:p>
-          <a:p>
-            <a:pPr lvl="1" fontAlgn="auto">
-              <a:lnSpc>
-                <a:spcPct val="140000"/>
-              </a:lnSpc>
-              <a:spcBef>
-                <a:spcPts val="0"/>
-              </a:spcBef>
-              <a:spcAft>
-                <a:spcPts val="0"/>
-              </a:spcAft>
-              <a:buClr>
-                <a:srgbClr val="000000"/>
-              </a:buClr>
-              <a:buFont typeface="Wingdings" panose="05000000000000000000" charset="0"/>
-              <a:buChar char=""/>
-            </a:pPr>
-            <a:r>
-              <a:rPr lang="uk-UA" altLang="en-US" sz="1600" i="1" dirty="0">
-                <a:solidFill>
-                  <a:srgbClr val="000000"/>
-                </a:solidFill>
-                <a:sym typeface="+mn-ea"/>
-              </a:rPr>
-              <a:t>Створити сторінку де розміщується інформація про тест</a:t>
-            </a:r>
-            <a:endParaRPr lang="uk-UA" altLang="en-US" sz="1600" i="1" dirty="0">
-              <a:solidFill>
-                <a:srgbClr val="000000"/>
-              </a:solidFill>
-              <a:sym typeface="+mn-ea"/>
-            </a:endParaRPr>
-          </a:p>
-          <a:p>
-            <a:pPr marL="457200" lvl="0" indent="-457200" fontAlgn="auto">
-              <a:lnSpc>
-                <a:spcPct val="140000"/>
-              </a:lnSpc>
-              <a:spcBef>
-                <a:spcPts val="0"/>
-              </a:spcBef>
-              <a:spcAft>
-                <a:spcPts val="0"/>
-              </a:spcAft>
-              <a:buClr>
-                <a:srgbClr val="000000"/>
-              </a:buClr>
-              <a:buFont typeface="Wingdings" panose="05000000000000000000" charset="0"/>
-              <a:buAutoNum type="arabicPeriod"/>
-            </a:pPr>
-            <a:r>
-              <a:rPr lang="uk-UA" altLang="en-US" sz="1600" dirty="0">
-                <a:solidFill>
-                  <a:srgbClr val="000000"/>
-                </a:solidFill>
-                <a:sym typeface="+mn-ea"/>
-              </a:rPr>
-              <a:t>Натискає кнопку розпочати тест і появляються питання тесту</a:t>
-            </a:r>
-            <a:endParaRPr lang="uk-UA" altLang="en-US" sz="1600" dirty="0">
-              <a:solidFill>
-                <a:srgbClr val="000000"/>
-              </a:solidFill>
-              <a:sym typeface="+mn-ea"/>
-            </a:endParaRPr>
-          </a:p>
-          <a:p>
-            <a:pPr lvl="1" fontAlgn="auto">
-              <a:lnSpc>
-                <a:spcPct val="140000"/>
-              </a:lnSpc>
-              <a:spcBef>
-                <a:spcPts val="0"/>
-              </a:spcBef>
-              <a:spcAft>
-                <a:spcPts val="0"/>
-              </a:spcAft>
-              <a:buClr>
-                <a:srgbClr val="000000"/>
-              </a:buClr>
-              <a:buFont typeface="Wingdings" panose="05000000000000000000" charset="0"/>
-              <a:buChar char=""/>
-            </a:pPr>
-            <a:r>
-              <a:rPr lang="uk-UA" altLang="en-US" sz="1600" i="1" dirty="0">
-                <a:solidFill>
-                  <a:srgbClr val="000000"/>
-                </a:solidFill>
-                <a:sym typeface="+mn-ea"/>
-              </a:rPr>
-              <a:t>Розробити таблицю з питаннями до тесту</a:t>
-            </a:r>
-            <a:endParaRPr lang="uk-UA" altLang="en-US" sz="1600" i="1" dirty="0">
-              <a:solidFill>
-                <a:srgbClr val="000000"/>
-              </a:solidFill>
-              <a:sym typeface="+mn-ea"/>
-            </a:endParaRPr>
-          </a:p>
-          <a:p>
-            <a:pPr lvl="1" fontAlgn="auto">
-              <a:lnSpc>
-                <a:spcPct val="140000"/>
-              </a:lnSpc>
-              <a:spcBef>
-                <a:spcPts val="0"/>
-              </a:spcBef>
-              <a:spcAft>
-                <a:spcPts val="0"/>
-              </a:spcAft>
-              <a:buClr>
-                <a:srgbClr val="000000"/>
-              </a:buClr>
-              <a:buFont typeface="Wingdings" panose="05000000000000000000" charset="0"/>
-              <a:buChar char=""/>
-            </a:pPr>
-            <a:r>
-              <a:rPr lang="uk-UA" altLang="en-US" sz="1600" i="1" dirty="0">
-                <a:solidFill>
-                  <a:srgbClr val="000000"/>
-                </a:solidFill>
-                <a:sym typeface="+mn-ea"/>
-              </a:rPr>
-              <a:t>Імпортувати питання в таблицю </a:t>
-            </a:r>
-            <a:endParaRPr lang="uk-UA" altLang="en-US" sz="1600" i="1" dirty="0">
-              <a:solidFill>
-                <a:srgbClr val="000000"/>
-              </a:solidFill>
-              <a:sym typeface="+mn-ea"/>
-            </a:endParaRPr>
-          </a:p>
-          <a:p>
-            <a:pPr lvl="1" fontAlgn="auto">
-              <a:lnSpc>
-                <a:spcPct val="140000"/>
-              </a:lnSpc>
-              <a:spcBef>
-                <a:spcPts val="0"/>
-              </a:spcBef>
-              <a:spcAft>
-                <a:spcPts val="0"/>
-              </a:spcAft>
-              <a:buClr>
-                <a:srgbClr val="000000"/>
-              </a:buClr>
-              <a:buFont typeface="Wingdings" panose="05000000000000000000" charset="0"/>
-              <a:buChar char=""/>
-            </a:pPr>
-            <a:r>
-              <a:rPr lang="uk-UA" altLang="en-US" sz="1600" i="1" dirty="0">
-                <a:solidFill>
-                  <a:srgbClr val="000000"/>
-                </a:solidFill>
-                <a:sym typeface="+mn-ea"/>
-              </a:rPr>
-              <a:t>Розробити </a:t>
-            </a:r>
-            <a:r>
-              <a:rPr lang="en-US" altLang="en-US" sz="1600" i="1" dirty="0">
-                <a:solidFill>
-                  <a:srgbClr val="000000"/>
-                </a:solidFill>
-                <a:sym typeface="+mn-ea"/>
-              </a:rPr>
-              <a:t>API </a:t>
-            </a:r>
-            <a:r>
-              <a:rPr lang="uk-UA" altLang="en-US" sz="1600" i="1" dirty="0">
-                <a:solidFill>
-                  <a:srgbClr val="000000"/>
-                </a:solidFill>
-                <a:sym typeface="+mn-ea"/>
-              </a:rPr>
-              <a:t>з</a:t>
-            </a:r>
-            <a:r>
-              <a:rPr lang="uk-UA" altLang="en-US" sz="1600" i="1" dirty="0">
-                <a:solidFill>
-                  <a:srgbClr val="000000"/>
-                </a:solidFill>
-                <a:sym typeface="+mn-ea"/>
-              </a:rPr>
-              <a:t>авантаження питань на сторінку тесту</a:t>
-            </a:r>
-            <a:endParaRPr lang="uk-UA" altLang="en-US" sz="1600" i="1" dirty="0">
-              <a:solidFill>
-                <a:srgbClr val="000000"/>
-              </a:solidFill>
-              <a:sym typeface="+mn-ea"/>
-            </a:endParaRPr>
-          </a:p>
-          <a:p>
-            <a:pPr marL="457200" lvl="0" indent="-457200" fontAlgn="auto">
-              <a:lnSpc>
-                <a:spcPct val="140000"/>
-              </a:lnSpc>
-              <a:spcBef>
-                <a:spcPts val="0"/>
-              </a:spcBef>
-              <a:spcAft>
-                <a:spcPts val="0"/>
-              </a:spcAft>
-              <a:buClr>
-                <a:srgbClr val="000000"/>
-              </a:buClr>
-              <a:buFont typeface="Wingdings" panose="05000000000000000000" charset="0"/>
-              <a:buAutoNum type="arabicPeriod"/>
-            </a:pPr>
-            <a:r>
-              <a:rPr lang="uk-UA" altLang="en-US" sz="1600" dirty="0">
-                <a:solidFill>
-                  <a:srgbClr val="000000"/>
-                </a:solidFill>
-                <a:sym typeface="+mn-ea"/>
-              </a:rPr>
-              <a:t>Після того як користувач натиснув кнопку “Підтвердити” тестування, йому виводиться результат</a:t>
-            </a:r>
-            <a:endParaRPr lang="uk-UA" altLang="en-US" sz="1600" dirty="0">
-              <a:solidFill>
-                <a:srgbClr val="000000"/>
-              </a:solidFill>
-              <a:sym typeface="+mn-ea"/>
-            </a:endParaRPr>
-          </a:p>
-          <a:p>
-            <a:pPr lvl="1" fontAlgn="auto">
-              <a:lnSpc>
-                <a:spcPct val="140000"/>
-              </a:lnSpc>
-              <a:spcBef>
-                <a:spcPts val="0"/>
-              </a:spcBef>
-              <a:spcAft>
-                <a:spcPts val="0"/>
-              </a:spcAft>
-              <a:buClr>
-                <a:srgbClr val="000000"/>
-              </a:buClr>
-              <a:buFont typeface="Wingdings" panose="05000000000000000000" charset="0"/>
-              <a:buChar char=""/>
-            </a:pPr>
-            <a:r>
-              <a:rPr lang="uk-UA" altLang="en-US" sz="1600" i="1" dirty="0">
-                <a:solidFill>
-                  <a:srgbClr val="000000"/>
-                </a:solidFill>
-                <a:sym typeface="+mn-ea"/>
-              </a:rPr>
-              <a:t>Розробити </a:t>
-            </a:r>
-            <a:r>
-              <a:rPr lang="en-US" altLang="en-US" sz="1600" i="1" dirty="0">
-                <a:solidFill>
-                  <a:srgbClr val="000000"/>
-                </a:solidFill>
-                <a:sym typeface="+mn-ea"/>
-              </a:rPr>
-              <a:t>API </a:t>
-            </a:r>
-            <a:r>
-              <a:rPr lang="uk-UA" altLang="en-US" sz="1600" i="1" dirty="0">
-                <a:solidFill>
-                  <a:srgbClr val="000000"/>
-                </a:solidFill>
-                <a:sym typeface="+mn-ea"/>
-              </a:rPr>
-              <a:t>виведення результату тесту з рекомедаціями</a:t>
-            </a:r>
-            <a:endParaRPr lang="uk-UA" altLang="en-US" sz="1600" i="1" dirty="0">
-              <a:solidFill>
-                <a:srgbClr val="000000"/>
-              </a:solidFill>
-              <a:sym typeface="+mn-ea"/>
-            </a:endParaRPr>
-          </a:p>
-          <a:p>
-            <a:pPr lvl="1" fontAlgn="auto">
-              <a:lnSpc>
-                <a:spcPct val="140000"/>
-              </a:lnSpc>
-              <a:spcBef>
-                <a:spcPts val="0"/>
-              </a:spcBef>
-              <a:spcAft>
-                <a:spcPts val="0"/>
-              </a:spcAft>
-              <a:buClr>
-                <a:srgbClr val="000000"/>
-              </a:buClr>
-            </a:pPr>
-            <a:endParaRPr lang="uk-UA" altLang="en-US" sz="1600" dirty="0">
-              <a:solidFill>
-                <a:srgbClr val="000000"/>
-              </a:solidFill>
-              <a:sym typeface="+mn-ea"/>
-            </a:endParaRPr>
-          </a:p>
-        </p:txBody>
-      </p:sp>
-      <p:sp>
-        <p:nvSpPr>
-          <p:cNvPr id="8" name="Заголовок 7"/>
-          <p:cNvSpPr>
-            <a:spLocks noGrp="1"/>
-          </p:cNvSpPr>
-          <p:nvPr>
-            <p:ph type="title"/>
-          </p:nvPr>
-        </p:nvSpPr>
-        <p:spPr>
-          <a:xfrm>
-            <a:off x="272415" y="343535"/>
-            <a:ext cx="8674100" cy="624840"/>
-          </a:xfrm>
-        </p:spPr>
-        <p:txBody>
-          <a:bodyPr/>
-          <a:lstStyle/>
-          <a:p>
-            <a:r>
-              <a:rPr lang="en-US" sz="2400"/>
-              <a:t>#</a:t>
-            </a:r>
-            <a:r>
-              <a:rPr lang="uk-UA" altLang="en-US" sz="2400"/>
-              <a:t>2 </a:t>
-            </a:r>
-            <a:br>
-              <a:rPr lang="uk-UA" altLang="en-US" sz="2400"/>
-            </a:br>
-            <a:r>
-              <a:rPr lang="uk-UA" sz="2400"/>
-              <a:t>Як користувач, я б хотів хотів зайти на сторінку з тестом на профорієнтацію і пройти його.</a:t>
-            </a:r>
-            <a:endParaRPr lang="uk-UA" sz="2400"/>
-          </a:p>
-        </p:txBody>
-      </p:sp>
-      <p:pic>
-        <p:nvPicPr>
-          <p:cNvPr id="3" name="Picture 2" descr="User ico (1)"/>
-          <p:cNvPicPr>
-            <a:picLocks noChangeAspect="1"/>
-          </p:cNvPicPr>
-          <p:nvPr/>
-        </p:nvPicPr>
-        <p:blipFill>
-          <a:blip r:embed="rId1"/>
-          <a:stretch>
-            <a:fillRect/>
-          </a:stretch>
-        </p:blipFill>
-        <p:spPr>
-          <a:xfrm>
-            <a:off x="7547610" y="968375"/>
-            <a:ext cx="965200" cy="965200"/>
-          </a:xfrm>
-          <a:prstGeom prst="rect">
-            <a:avLst/>
-          </a:prstGeom>
-        </p:spPr>
-      </p:pic>
-    </p:spTree>
-  </p:cSld>
-  <p:clrMapOvr>
-    <a:masterClrMapping/>
-  </p:clrMapOvr>
-  <p:timing>
-    <p:tnLst>
-      <p:par>
-        <p:cTn id="1" dur="indefinite" restart="never" nodeType="tmRoot"/>
-      </p:par>
-    </p:tnLst>
-  </p:timing>
-</p:sld>
-</file>
-
-<file path=ppt/slides/slide5.xml><?xml version="1.0" encoding="utf-8"?>
-<p:sld xmlns:a="http://schemas.openxmlformats.org/drawingml/2006/main" xmlns:r="http://schemas.openxmlformats.org/officeDocument/2006/relationships" xmlns:p="http://schemas.openxmlformats.org/presentationml/2006/main">
-  <p:cSld>
-    <p:spTree>
-      <p:nvGrpSpPr>
-        <p:cNvPr id="1" name=""/>
-        <p:cNvGrpSpPr/>
-        <p:nvPr/>
-      </p:nvGrpSpPr>
       <p:grpSpPr/>
       <p:sp>
         <p:nvSpPr>
@@ -5970,7 +5855,6 @@
             <a:pPr algn="ctr"/>
             <a:r>
               <a:rPr lang="en-US">
-                <a:ln/>
                 <a:solidFill>
                   <a:schemeClr val="tx1"/>
                 </a:solidFill>
@@ -5986,7 +5870,6 @@
             </a:r>
             <a:r>
               <a:rPr lang="uk-UA">
-                <a:ln/>
                 <a:solidFill>
                   <a:schemeClr val="tx1"/>
                 </a:solidFill>
@@ -6002,7 +5885,6 @@
             </a:r>
             <a:r>
               <a:rPr lang="en-US" altLang="uk-UA">
-                <a:ln/>
                 <a:solidFill>
                   <a:schemeClr val="tx1"/>
                 </a:solidFill>
@@ -6017,7 +5899,6 @@
               <a:t>2</a:t>
             </a:r>
             <a:endParaRPr lang="en-US" altLang="uk-UA">
-              <a:ln/>
               <a:solidFill>
                 <a:schemeClr val="tx1"/>
               </a:solidFill>
@@ -6064,7 +5945,7 @@
 </p:sld>
 </file>
 
-<file path=ppt/slides/slide6.xml><?xml version="1.0" encoding="utf-8"?>
+<file path=ppt/slides/slide5.xml><?xml version="1.0" encoding="utf-8"?>
 <p:sld xmlns:a="http://schemas.openxmlformats.org/drawingml/2006/main" xmlns:r="http://schemas.openxmlformats.org/officeDocument/2006/relationships" xmlns:p="http://schemas.openxmlformats.org/presentationml/2006/main">
   <p:cSld>
     <p:spTree>

</xml_diff>